<commit_message>
Made changes on index slide and forking slide
</commit_message>
<xml_diff>
--- a/CSC at CSM  at  GitHub.pptx
+++ b/CSC at CSM  at  GitHub.pptx
@@ -111,6 +111,11 @@
       </a:defRPr>
     </a:lvl9pPr>
   </p:defaultTextStyle>
+  <p:extLst>
+    <p:ext uri="{EFAFB233-063F-42B5-8137-9DF3F51BA10A}">
+      <p15:sldGuideLst xmlns:p15="http://schemas.microsoft.com/office/powerpoint/2012/main"/>
+    </p:ext>
+  </p:extLst>
 </p:presentation>
 </file>
 
@@ -3768,7 +3773,19 @@
           <a:p>
             <a:r>
               <a:rPr lang="en-US" altLang="zh-TW" dirty="0" smtClean="0"/>
-              <a:t>CSC at CSM  at  GitHub </a:t>
+              <a:t>CSC at CSM  </a:t>
+            </a:r>
+            <a:r>
+              <a:rPr lang="en-US" altLang="zh-TW" dirty="0" smtClean="0"/>
+              <a:t>and</a:t>
+            </a:r>
+            <a:r>
+              <a:rPr lang="en-US" altLang="zh-TW" dirty="0" smtClean="0"/>
+              <a:t>  </a:t>
+            </a:r>
+            <a:r>
+              <a:rPr lang="en-US" altLang="zh-TW" dirty="0" smtClean="0"/>
+              <a:t>GitHub </a:t>
             </a:r>
             <a:endParaRPr lang="zh-TW" altLang="en-US" dirty="0"/>
           </a:p>
@@ -3875,8 +3892,13 @@
           <a:p>
             <a:r>
               <a:rPr lang="en-US" altLang="zh-TW" sz="2800" dirty="0" smtClean="0"/>
-              <a:t>1. Introduction: What we do on GitHub, how GitHub can help what we want.</a:t>
-            </a:r>
+              <a:t>1. Introduction: What we do on GitHub, how GitHub can help </a:t>
+            </a:r>
+            <a:r>
+              <a:rPr lang="en-US" altLang="zh-TW" sz="2800" dirty="0" smtClean="0"/>
+              <a:t>us accomplish our tasks.</a:t>
+            </a:r>
+            <a:endParaRPr lang="en-US" altLang="zh-TW" sz="2800" dirty="0" smtClean="0"/>
           </a:p>
           <a:p>
             <a:r>
@@ -4178,7 +4200,7 @@
         <p:spPr/>
         <p:txBody>
           <a:bodyPr>
-            <a:normAutofit fontScale="90000"/>
+            <a:normAutofit/>
           </a:bodyPr>
           <a:lstStyle/>
           <a:p>
@@ -4208,7 +4230,11 @@
           <a:bodyPr/>
           <a:lstStyle/>
           <a:p>
-            <a:endParaRPr lang="zh-TW" altLang="en-US"/>
+            <a:r>
+              <a:rPr lang="en-US" altLang="zh-TW" dirty="0"/>
+              <a:t>https://help.github.com/articles/fork-a-repo/</a:t>
+            </a:r>
+            <a:endParaRPr lang="zh-TW" altLang="en-US" dirty="0"/>
           </a:p>
         </p:txBody>
       </p:sp>

</xml_diff>